<commit_message>
Milestone 4 Presentation Complete
</commit_message>
<xml_diff>
--- a/Milestone 4/Milestone 4 Report Out Tempate.pptx
+++ b/Milestone 4/Milestone 4 Report Out Tempate.pptx
@@ -13126,8 +13126,8 @@
         </p:blipFill>
         <p:spPr>
           <a:xfrm>
-            <a:off x="1214225" y="883675"/>
-            <a:ext cx="6267249" cy="4097951"/>
+            <a:off x="382425" y="819150"/>
+            <a:ext cx="7346625" cy="4140200"/>
           </a:xfrm>
           <a:prstGeom prst="rect">
             <a:avLst/>
@@ -13568,8 +13568,8 @@
         </p:blipFill>
         <p:spPr>
           <a:xfrm>
-            <a:off x="846850" y="855775"/>
-            <a:ext cx="6703474" cy="4243150"/>
+            <a:off x="285750" y="1053669"/>
+            <a:ext cx="8572500" cy="3533775"/>
           </a:xfrm>
           <a:prstGeom prst="rect">
             <a:avLst/>
@@ -13932,7 +13932,35 @@
                   <a:srgbClr val="FFFFFF"/>
                 </a:solidFill>
               </a:rPr>
-              <a:t>Difficulty with the likes system</a:t>
+              <a:t>Difficulty with the likes system, Overall successful</a:t>
+            </a:r>
+            <a:endParaRPr sz="1800">
+              <a:solidFill>
+                <a:srgbClr val="FFFFFF"/>
+              </a:solidFill>
+            </a:endParaRPr>
+          </a:p>
+          <a:p>
+            <a:pPr indent="-342900" lvl="0" marL="457200" rtl="0" algn="l">
+              <a:spcBef>
+                <a:spcPts val="0"/>
+              </a:spcBef>
+              <a:spcAft>
+                <a:spcPts val="0"/>
+              </a:spcAft>
+              <a:buClr>
+                <a:srgbClr val="FFFFFF"/>
+              </a:buClr>
+              <a:buSzPts val="1800"/>
+              <a:buChar char="•"/>
+            </a:pPr>
+            <a:r>
+              <a:rPr lang="en" sz="1800">
+                <a:solidFill>
+                  <a:srgbClr val="FFFFFF"/>
+                </a:solidFill>
+              </a:rPr>
+              <a:t>Liked the end result of milestone</a:t>
             </a:r>
             <a:endParaRPr sz="1800">
               <a:solidFill>
@@ -14279,9 +14307,9 @@
 </file>
 
 <file path=ppt/theme/theme1.xml><?xml version="1.0" encoding="utf-8"?>
-<a:theme xmlns:a="http://schemas.openxmlformats.org/drawingml/2006/main" xmlns:r="http://schemas.openxmlformats.org/officeDocument/2006/relationships" name="Simple Light">
+<a:theme xmlns:a="http://schemas.openxmlformats.org/drawingml/2006/main" xmlns:r="http://schemas.openxmlformats.org/officeDocument/2006/relationships">
   <a:themeElements>
-    <a:clrScheme name="Simple Light">
+    <a:clrScheme name="Default">
       <a:dk1>
         <a:srgbClr val="000000"/>
       </a:dk1>
@@ -14289,34 +14317,34 @@
         <a:srgbClr val="FFFFFF"/>
       </a:lt1>
       <a:dk2>
-        <a:srgbClr val="595959"/>
+        <a:srgbClr val="158158"/>
       </a:dk2>
       <a:lt2>
-        <a:srgbClr val="EEEEEE"/>
+        <a:srgbClr val="F3F3F3"/>
       </a:lt2>
       <a:accent1>
-        <a:srgbClr val="FFAB40"/>
+        <a:srgbClr val="058DC7"/>
       </a:accent1>
       <a:accent2>
-        <a:srgbClr val="212121"/>
+        <a:srgbClr val="50B432"/>
       </a:accent2>
       <a:accent3>
-        <a:srgbClr val="78909C"/>
+        <a:srgbClr val="ED561B"/>
       </a:accent3>
       <a:accent4>
-        <a:srgbClr val="FFAB40"/>
+        <a:srgbClr val="EDEF00"/>
       </a:accent4>
       <a:accent5>
-        <a:srgbClr val="0097A7"/>
+        <a:srgbClr val="24CBE5"/>
       </a:accent5>
       <a:accent6>
-        <a:srgbClr val="EEFF41"/>
+        <a:srgbClr val="64E572"/>
       </a:accent6>
       <a:hlink>
-        <a:srgbClr val="0097A7"/>
+        <a:srgbClr val="2200CC"/>
       </a:hlink>
       <a:folHlink>
-        <a:srgbClr val="0097A7"/>
+        <a:srgbClr val="551A8B"/>
       </a:folHlink>
     </a:clrScheme>
     <a:fontScheme name="Office">
@@ -15116,9 +15144,9 @@
 </file>
 
 <file path=ppt/theme/theme4.xml><?xml version="1.0" encoding="utf-8"?>
-<a:theme xmlns:a="http://schemas.openxmlformats.org/drawingml/2006/main" xmlns:r="http://schemas.openxmlformats.org/officeDocument/2006/relationships">
+<a:theme xmlns:a="http://schemas.openxmlformats.org/drawingml/2006/main" xmlns:r="http://schemas.openxmlformats.org/officeDocument/2006/relationships" name="Simple Light">
   <a:themeElements>
-    <a:clrScheme name="Default">
+    <a:clrScheme name="Simple Light">
       <a:dk1>
         <a:srgbClr val="000000"/>
       </a:dk1>
@@ -15126,34 +15154,34 @@
         <a:srgbClr val="FFFFFF"/>
       </a:lt1>
       <a:dk2>
-        <a:srgbClr val="158158"/>
+        <a:srgbClr val="595959"/>
       </a:dk2>
       <a:lt2>
-        <a:srgbClr val="F3F3F3"/>
+        <a:srgbClr val="EEEEEE"/>
       </a:lt2>
       <a:accent1>
-        <a:srgbClr val="058DC7"/>
+        <a:srgbClr val="FFAB40"/>
       </a:accent1>
       <a:accent2>
-        <a:srgbClr val="50B432"/>
+        <a:srgbClr val="212121"/>
       </a:accent2>
       <a:accent3>
-        <a:srgbClr val="ED561B"/>
+        <a:srgbClr val="78909C"/>
       </a:accent3>
       <a:accent4>
-        <a:srgbClr val="EDEF00"/>
+        <a:srgbClr val="FFAB40"/>
       </a:accent4>
       <a:accent5>
-        <a:srgbClr val="24CBE5"/>
+        <a:srgbClr val="0097A7"/>
       </a:accent5>
       <a:accent6>
-        <a:srgbClr val="64E572"/>
+        <a:srgbClr val="EEFF41"/>
       </a:accent6>
       <a:hlink>
-        <a:srgbClr val="2200CC"/>
+        <a:srgbClr val="0097A7"/>
       </a:hlink>
       <a:folHlink>
-        <a:srgbClr val="551A8B"/>
+        <a:srgbClr val="0097A7"/>
       </a:folHlink>
     </a:clrScheme>
     <a:fontScheme name="Office">

</xml_diff>